<commit_message>
more links added + readme
</commit_message>
<xml_diff>
--- a/opdracht1-1/afbeeldingen.pptx
+++ b/opdracht1-1/afbeeldingen.pptx
@@ -195,7 +195,7 @@
           <a:p>
             <a:fld id="{036E41D1-5F50-4B1E-9F05-FCE907C084F7}" type="datetimeFigureOut">
               <a:rPr lang="nl-NL" smtClean="0"/>
-              <a:t>8-3-2016</a:t>
+              <a:t>11-3-2016</a:t>
             </a:fld>
             <a:endParaRPr lang="nl-NL"/>
           </a:p>
@@ -747,7 +747,7 @@
           <a:p>
             <a:fld id="{3D636C07-7E76-46D3-B86B-6AF7C60E533E}" type="datetimeFigureOut">
               <a:rPr lang="nl-NL" smtClean="0"/>
-              <a:t>8-3-2016</a:t>
+              <a:t>11-3-2016</a:t>
             </a:fld>
             <a:endParaRPr lang="nl-NL"/>
           </a:p>
@@ -912,7 +912,7 @@
           <a:p>
             <a:fld id="{3D636C07-7E76-46D3-B86B-6AF7C60E533E}" type="datetimeFigureOut">
               <a:rPr lang="nl-NL" smtClean="0"/>
-              <a:t>8-3-2016</a:t>
+              <a:t>11-3-2016</a:t>
             </a:fld>
             <a:endParaRPr lang="nl-NL"/>
           </a:p>
@@ -1087,7 +1087,7 @@
           <a:p>
             <a:fld id="{3D636C07-7E76-46D3-B86B-6AF7C60E533E}" type="datetimeFigureOut">
               <a:rPr lang="nl-NL" smtClean="0"/>
-              <a:t>8-3-2016</a:t>
+              <a:t>11-3-2016</a:t>
             </a:fld>
             <a:endParaRPr lang="nl-NL"/>
           </a:p>
@@ -1270,7 +1270,7 @@
           <a:p>
             <a:fld id="{3D636C07-7E76-46D3-B86B-6AF7C60E533E}" type="datetimeFigureOut">
               <a:rPr lang="nl-NL" smtClean="0"/>
-              <a:t>8-3-2016</a:t>
+              <a:t>11-3-2016</a:t>
             </a:fld>
             <a:endParaRPr lang="nl-NL"/>
           </a:p>
@@ -1532,7 +1532,7 @@
           <a:p>
             <a:fld id="{3D636C07-7E76-46D3-B86B-6AF7C60E533E}" type="datetimeFigureOut">
               <a:rPr lang="nl-NL" smtClean="0"/>
-              <a:t>8-3-2016</a:t>
+              <a:t>11-3-2016</a:t>
             </a:fld>
             <a:endParaRPr lang="nl-NL"/>
           </a:p>
@@ -1880,7 +1880,7 @@
           <a:p>
             <a:fld id="{3D636C07-7E76-46D3-B86B-6AF7C60E533E}" type="datetimeFigureOut">
               <a:rPr lang="nl-NL" smtClean="0"/>
-              <a:t>8-3-2016</a:t>
+              <a:t>11-3-2016</a:t>
             </a:fld>
             <a:endParaRPr lang="nl-NL"/>
           </a:p>
@@ -2188,7 +2188,7 @@
           <a:p>
             <a:fld id="{3D636C07-7E76-46D3-B86B-6AF7C60E533E}" type="datetimeFigureOut">
               <a:rPr lang="nl-NL" smtClean="0"/>
-              <a:t>8-3-2016</a:t>
+              <a:t>11-3-2016</a:t>
             </a:fld>
             <a:endParaRPr lang="nl-NL"/>
           </a:p>
@@ -2415,7 +2415,7 @@
           <a:p>
             <a:fld id="{3D636C07-7E76-46D3-B86B-6AF7C60E533E}" type="datetimeFigureOut">
               <a:rPr lang="nl-NL" smtClean="0"/>
-              <a:t>8-3-2016</a:t>
+              <a:t>11-3-2016</a:t>
             </a:fld>
             <a:endParaRPr lang="nl-NL"/>
           </a:p>
@@ -2505,7 +2505,7 @@
           <a:p>
             <a:fld id="{3D636C07-7E76-46D3-B86B-6AF7C60E533E}" type="datetimeFigureOut">
               <a:rPr lang="nl-NL" smtClean="0"/>
-              <a:t>8-3-2016</a:t>
+              <a:t>11-3-2016</a:t>
             </a:fld>
             <a:endParaRPr lang="nl-NL"/>
           </a:p>
@@ -2793,7 +2793,7 @@
           <a:p>
             <a:fld id="{3D636C07-7E76-46D3-B86B-6AF7C60E533E}" type="datetimeFigureOut">
               <a:rPr lang="nl-NL" smtClean="0"/>
-              <a:t>8-3-2016</a:t>
+              <a:t>11-3-2016</a:t>
             </a:fld>
             <a:endParaRPr lang="nl-NL"/>
           </a:p>
@@ -3062,7 +3062,7 @@
           <a:p>
             <a:fld id="{3D636C07-7E76-46D3-B86B-6AF7C60E533E}" type="datetimeFigureOut">
               <a:rPr lang="nl-NL" smtClean="0"/>
-              <a:t>8-3-2016</a:t>
+              <a:t>11-3-2016</a:t>
             </a:fld>
             <a:endParaRPr lang="nl-NL"/>
           </a:p>
@@ -3272,7 +3272,7 @@
           <a:p>
             <a:fld id="{3D636C07-7E76-46D3-B86B-6AF7C60E533E}" type="datetimeFigureOut">
               <a:rPr lang="nl-NL" smtClean="0"/>
-              <a:t>8-3-2016</a:t>
+              <a:t>11-3-2016</a:t>
             </a:fld>
             <a:endParaRPr lang="nl-NL"/>
           </a:p>
@@ -4298,7 +4298,7 @@
         <p:spPr>
           <a:xfrm>
             <a:off x="1459672" y="2132856"/>
-            <a:ext cx="7072768" cy="2677656"/>
+            <a:ext cx="7072768" cy="3539430"/>
           </a:xfrm>
           <a:prstGeom prst="rect">
             <a:avLst/>
@@ -4465,6 +4465,62 @@
               <a:rPr lang="nl-NL" sz="2800" dirty="0" smtClean="0"/>
               <a:t>)</a:t>
             </a:r>
+          </a:p>
+          <a:p>
+            <a:pPr marL="285750" indent="-285750">
+              <a:buFont typeface="Arial" panose="020B0604020202020204" pitchFamily="34" charset="0"/>
+              <a:buChar char="•"/>
+            </a:pPr>
+            <a:r>
+              <a:rPr lang="nl-NL" sz="2800" dirty="0" err="1" smtClean="0"/>
+              <a:t>Knowyourmobile</a:t>
+            </a:r>
+            <a:r>
+              <a:rPr lang="nl-NL" sz="2800" dirty="0"/>
+              <a:t> </a:t>
+            </a:r>
+            <a:r>
+              <a:rPr lang="nl-NL" sz="2800" dirty="0" smtClean="0"/>
+              <a:t>(</a:t>
+            </a:r>
+            <a:r>
+              <a:rPr lang="nl-NL" sz="2800" dirty="0" smtClean="0">
+                <a:hlinkClick r:id="rId9"/>
+              </a:rPr>
+              <a:t>www.knowyourmobile.com</a:t>
+            </a:r>
+            <a:r>
+              <a:rPr lang="nl-NL" sz="2800" dirty="0" smtClean="0"/>
+              <a:t>)</a:t>
+            </a:r>
+          </a:p>
+          <a:p>
+            <a:pPr marL="285750" indent="-285750">
+              <a:buFont typeface="Arial" panose="020B0604020202020204" pitchFamily="34" charset="0"/>
+              <a:buChar char="•"/>
+            </a:pPr>
+            <a:r>
+              <a:rPr lang="nl-NL" sz="2800" dirty="0" err="1" smtClean="0"/>
+              <a:t>UnitApp</a:t>
+            </a:r>
+            <a:r>
+              <a:rPr lang="nl-NL" sz="2800" dirty="0"/>
+              <a:t> </a:t>
+            </a:r>
+            <a:r>
+              <a:rPr lang="nl-NL" sz="2800" dirty="0" smtClean="0"/>
+              <a:t>(</a:t>
+            </a:r>
+            <a:r>
+              <a:rPr lang="nl-NL" sz="2800" dirty="0" smtClean="0">
+                <a:hlinkClick r:id="rId10"/>
+              </a:rPr>
+              <a:t>www.unitapp.com</a:t>
+            </a:r>
+            <a:r>
+              <a:rPr lang="nl-NL" sz="2800" dirty="0" smtClean="0"/>
+              <a:t>)</a:t>
+            </a:r>
             <a:endParaRPr lang="nl-NL" sz="2800" dirty="0"/>
           </a:p>
         </p:txBody>
@@ -4494,11 +4550,7 @@
             </a:pPr>
             <a:r>
               <a:rPr lang="nl-NL" dirty="0" smtClean="0"/>
-              <a:t>Welke websites </a:t>
-            </a:r>
-            <a:r>
-              <a:rPr lang="nl-NL" dirty="0" smtClean="0"/>
-              <a:t>breken wanneer afbeeldingen zijn uitgeschakeld?</a:t>
+              <a:t>Welke websites breken wanneer afbeeldingen zijn uitgeschakeld?</a:t>
             </a:r>
             <a:endParaRPr lang="nl-NL" dirty="0"/>
           </a:p>

</xml_diff>